<commit_message>
update calculate steady state function
</commit_message>
<xml_diff>
--- a/C1_documentation/problems_ice.pptx
+++ b/C1_documentation/problems_ice.pptx
@@ -5,7 +5,11 @@
     <p:sldMasterId id="2147483648" r:id="rId1"/>
   </p:sldMasterIdLst>
   <p:sldIdLst>
-    <p:sldId id="256" r:id="rId2"/>
+    <p:sldId id="259" r:id="rId2"/>
+    <p:sldId id="256" r:id="rId3"/>
+    <p:sldId id="257" r:id="rId4"/>
+    <p:sldId id="258" r:id="rId5"/>
+    <p:sldId id="260" r:id="rId6"/>
   </p:sldIdLst>
   <p:sldSz cx="12192000" cy="6858000"/>
   <p:notesSz cx="6858000" cy="9144000"/>
@@ -104,6 +108,11 @@
       </a:defRPr>
     </a:lvl9pPr>
   </p:defaultTextStyle>
+  <p:extLst>
+    <p:ext uri="{EFAFB233-063F-42B5-8137-9DF3F51BA10A}">
+      <p15:sldGuideLst xmlns:p15="http://schemas.microsoft.com/office/powerpoint/2012/main"/>
+    </p:ext>
+  </p:extLst>
 </p:presentation>
 </file>
 
@@ -238,7 +247,7 @@
           <a:p>
             <a:fld id="{A3DFD1C4-66D6-4B95-91DF-B66FF7618C52}" type="datetimeFigureOut">
               <a:rPr lang="en-US" smtClean="0"/>
-              <a:t>4/24/2024</a:t>
+              <a:t>6/3/2024</a:t>
             </a:fld>
             <a:endParaRPr lang="en-US"/>
           </a:p>
@@ -408,7 +417,7 @@
           <a:p>
             <a:fld id="{A3DFD1C4-66D6-4B95-91DF-B66FF7618C52}" type="datetimeFigureOut">
               <a:rPr lang="en-US" smtClean="0"/>
-              <a:t>4/24/2024</a:t>
+              <a:t>6/3/2024</a:t>
             </a:fld>
             <a:endParaRPr lang="en-US"/>
           </a:p>
@@ -588,7 +597,7 @@
           <a:p>
             <a:fld id="{A3DFD1C4-66D6-4B95-91DF-B66FF7618C52}" type="datetimeFigureOut">
               <a:rPr lang="en-US" smtClean="0"/>
-              <a:t>4/24/2024</a:t>
+              <a:t>6/3/2024</a:t>
             </a:fld>
             <a:endParaRPr lang="en-US"/>
           </a:p>
@@ -758,7 +767,7 @@
           <a:p>
             <a:fld id="{A3DFD1C4-66D6-4B95-91DF-B66FF7618C52}" type="datetimeFigureOut">
               <a:rPr lang="en-US" smtClean="0"/>
-              <a:t>4/24/2024</a:t>
+              <a:t>6/3/2024</a:t>
             </a:fld>
             <a:endParaRPr lang="en-US"/>
           </a:p>
@@ -1004,7 +1013,7 @@
           <a:p>
             <a:fld id="{A3DFD1C4-66D6-4B95-91DF-B66FF7618C52}" type="datetimeFigureOut">
               <a:rPr lang="en-US" smtClean="0"/>
-              <a:t>4/24/2024</a:t>
+              <a:t>6/3/2024</a:t>
             </a:fld>
             <a:endParaRPr lang="en-US"/>
           </a:p>
@@ -1236,7 +1245,7 @@
           <a:p>
             <a:fld id="{A3DFD1C4-66D6-4B95-91DF-B66FF7618C52}" type="datetimeFigureOut">
               <a:rPr lang="en-US" smtClean="0"/>
-              <a:t>4/24/2024</a:t>
+              <a:t>6/3/2024</a:t>
             </a:fld>
             <a:endParaRPr lang="en-US"/>
           </a:p>
@@ -1603,7 +1612,7 @@
           <a:p>
             <a:fld id="{A3DFD1C4-66D6-4B95-91DF-B66FF7618C52}" type="datetimeFigureOut">
               <a:rPr lang="en-US" smtClean="0"/>
-              <a:t>4/24/2024</a:t>
+              <a:t>6/3/2024</a:t>
             </a:fld>
             <a:endParaRPr lang="en-US"/>
           </a:p>
@@ -1721,7 +1730,7 @@
           <a:p>
             <a:fld id="{A3DFD1C4-66D6-4B95-91DF-B66FF7618C52}" type="datetimeFigureOut">
               <a:rPr lang="en-US" smtClean="0"/>
-              <a:t>4/24/2024</a:t>
+              <a:t>6/3/2024</a:t>
             </a:fld>
             <a:endParaRPr lang="en-US"/>
           </a:p>
@@ -1816,7 +1825,7 @@
           <a:p>
             <a:fld id="{A3DFD1C4-66D6-4B95-91DF-B66FF7618C52}" type="datetimeFigureOut">
               <a:rPr lang="en-US" smtClean="0"/>
-              <a:t>4/24/2024</a:t>
+              <a:t>6/3/2024</a:t>
             </a:fld>
             <a:endParaRPr lang="en-US"/>
           </a:p>
@@ -2093,7 +2102,7 @@
           <a:p>
             <a:fld id="{A3DFD1C4-66D6-4B95-91DF-B66FF7618C52}" type="datetimeFigureOut">
               <a:rPr lang="en-US" smtClean="0"/>
-              <a:t>4/24/2024</a:t>
+              <a:t>6/3/2024</a:t>
             </a:fld>
             <a:endParaRPr lang="en-US"/>
           </a:p>
@@ -2346,7 +2355,7 @@
           <a:p>
             <a:fld id="{A3DFD1C4-66D6-4B95-91DF-B66FF7618C52}" type="datetimeFigureOut">
               <a:rPr lang="en-US" smtClean="0"/>
-              <a:t>4/24/2024</a:t>
+              <a:t>6/3/2024</a:t>
             </a:fld>
             <a:endParaRPr lang="en-US"/>
           </a:p>
@@ -2559,7 +2568,7 @@
           <a:p>
             <a:fld id="{A3DFD1C4-66D6-4B95-91DF-B66FF7618C52}" type="datetimeFigureOut">
               <a:rPr lang="en-US" smtClean="0"/>
-              <a:t>4/24/2024</a:t>
+              <a:t>6/3/2024</a:t>
             </a:fld>
             <a:endParaRPr lang="en-US"/>
           </a:p>
@@ -2980,8 +2989,483 @@
           <a:lstStyle/>
           <a:p>
             <a:r>
-              <a:rPr lang="fr-CH" dirty="0" err="1" smtClean="0"/>
-              <a:t>Problems</a:t>
+              <a:rPr lang="fr-CH" dirty="0" smtClean="0"/>
+              <a:t>Genesis</a:t>
+            </a:r>
+            <a:endParaRPr lang="en-US" dirty="0"/>
+          </a:p>
+        </p:txBody>
+      </p:sp>
+      <p:sp>
+        <p:nvSpPr>
+          <p:cNvPr id="5" name="Content Placeholder 4"/>
+          <p:cNvSpPr>
+            <a:spLocks noGrp="1"/>
+          </p:cNvSpPr>
+          <p:nvPr>
+            <p:ph idx="1"/>
+          </p:nvPr>
+        </p:nvSpPr>
+        <p:spPr/>
+        <p:txBody>
+          <a:bodyPr>
+            <a:normAutofit lnSpcReduction="10000"/>
+          </a:bodyPr>
+          <a:lstStyle/>
+          <a:p>
+            <a:r>
+              <a:rPr lang="fr-CH" dirty="0" err="1" smtClean="0"/>
+              <a:t>We</a:t>
+            </a:r>
+            <a:r>
+              <a:rPr lang="fr-CH" dirty="0" smtClean="0"/>
+              <a:t> </a:t>
+            </a:r>
+            <a:r>
+              <a:rPr lang="fr-CH" dirty="0" err="1" smtClean="0"/>
+              <a:t>want</a:t>
+            </a:r>
+            <a:r>
+              <a:rPr lang="fr-CH" dirty="0" smtClean="0"/>
+              <a:t> the </a:t>
+            </a:r>
+            <a:r>
+              <a:rPr lang="fr-CH" dirty="0" err="1" smtClean="0"/>
+              <a:t>response</a:t>
+            </a:r>
+            <a:r>
+              <a:rPr lang="fr-CH" dirty="0" smtClean="0"/>
+              <a:t> </a:t>
+            </a:r>
+            <a:r>
+              <a:rPr lang="fr-CH" dirty="0" err="1" smtClean="0"/>
+              <a:t>shape</a:t>
+            </a:r>
+            <a:r>
+              <a:rPr lang="fr-CH" dirty="0" smtClean="0"/>
+              <a:t> of </a:t>
+            </a:r>
+            <a:r>
+              <a:rPr lang="fr-CH" dirty="0" err="1" smtClean="0"/>
+              <a:t>Streambugs</a:t>
+            </a:r>
+            <a:endParaRPr lang="fr-CH" dirty="0" smtClean="0"/>
+          </a:p>
+          <a:p>
+            <a:r>
+              <a:rPr lang="fr-CH" dirty="0" err="1" smtClean="0"/>
+              <a:t>We</a:t>
+            </a:r>
+            <a:r>
+              <a:rPr lang="fr-CH" dirty="0" smtClean="0"/>
+              <a:t> </a:t>
+            </a:r>
+            <a:r>
+              <a:rPr lang="fr-CH" dirty="0" err="1" smtClean="0"/>
+              <a:t>make</a:t>
+            </a:r>
+            <a:r>
+              <a:rPr lang="fr-CH" dirty="0" smtClean="0"/>
+              <a:t> </a:t>
+            </a:r>
+            <a:r>
+              <a:rPr lang="fr-CH" dirty="0" err="1" smtClean="0"/>
+              <a:t>tempmax</a:t>
+            </a:r>
+            <a:r>
+              <a:rPr lang="fr-CH" dirty="0" smtClean="0"/>
+              <a:t> </a:t>
+            </a:r>
+            <a:r>
+              <a:rPr lang="fr-CH" dirty="0" err="1" smtClean="0"/>
+              <a:t>vary</a:t>
+            </a:r>
+            <a:endParaRPr lang="fr-CH" dirty="0" smtClean="0"/>
+          </a:p>
+          <a:p>
+            <a:pPr lvl="1"/>
+            <a:r>
+              <a:rPr lang="fr-CH" dirty="0" err="1" smtClean="0"/>
+              <a:t>What</a:t>
+            </a:r>
+            <a:r>
+              <a:rPr lang="fr-CH" dirty="0" smtClean="0"/>
+              <a:t> about </a:t>
+            </a:r>
+            <a:r>
+              <a:rPr lang="fr-CH" dirty="0" err="1" smtClean="0"/>
+              <a:t>temp</a:t>
+            </a:r>
+            <a:r>
+              <a:rPr lang="fr-CH" dirty="0" smtClean="0"/>
+              <a:t> </a:t>
+            </a:r>
+            <a:r>
+              <a:rPr lang="fr-CH" dirty="0" err="1" smtClean="0"/>
+              <a:t>average</a:t>
+            </a:r>
+            <a:r>
+              <a:rPr lang="fr-CH" dirty="0" smtClean="0"/>
+              <a:t> </a:t>
+            </a:r>
+            <a:r>
+              <a:rPr lang="fr-CH" dirty="0" err="1" smtClean="0"/>
+              <a:t>going</a:t>
+            </a:r>
+            <a:r>
+              <a:rPr lang="fr-CH" dirty="0" smtClean="0"/>
+              <a:t> in </a:t>
+            </a:r>
+            <a:r>
+              <a:rPr lang="fr-CH" dirty="0" err="1" smtClean="0"/>
+              <a:t>metabolic</a:t>
+            </a:r>
+            <a:r>
+              <a:rPr lang="fr-CH" dirty="0" smtClean="0"/>
+              <a:t> rate? </a:t>
+            </a:r>
+            <a:r>
+              <a:rPr lang="fr-CH" dirty="0" err="1" smtClean="0"/>
+              <a:t>We</a:t>
+            </a:r>
+            <a:r>
+              <a:rPr lang="fr-CH" dirty="0" smtClean="0"/>
+              <a:t> </a:t>
+            </a:r>
+            <a:r>
+              <a:rPr lang="fr-CH" dirty="0" err="1" smtClean="0"/>
+              <a:t>don’t</a:t>
+            </a:r>
+            <a:r>
+              <a:rPr lang="fr-CH" dirty="0" smtClean="0"/>
+              <a:t> change </a:t>
+            </a:r>
+            <a:r>
+              <a:rPr lang="fr-CH" dirty="0" err="1" smtClean="0"/>
+              <a:t>it</a:t>
+            </a:r>
+            <a:r>
+              <a:rPr lang="fr-CH" dirty="0" smtClean="0"/>
+              <a:t> for </a:t>
+            </a:r>
+            <a:r>
+              <a:rPr lang="fr-CH" dirty="0" err="1" smtClean="0"/>
+              <a:t>now</a:t>
+            </a:r>
+            <a:endParaRPr lang="fr-CH" dirty="0" smtClean="0"/>
+          </a:p>
+          <a:p>
+            <a:r>
+              <a:rPr lang="fr-CH" dirty="0" smtClean="0"/>
+              <a:t>For </a:t>
+            </a:r>
+            <a:r>
+              <a:rPr lang="fr-CH" dirty="0" err="1" smtClean="0"/>
+              <a:t>some</a:t>
+            </a:r>
+            <a:r>
+              <a:rPr lang="fr-CH" dirty="0" smtClean="0"/>
+              <a:t> taxa and site the line stops </a:t>
+            </a:r>
+            <a:r>
+              <a:rPr lang="fr-CH" dirty="0" err="1" smtClean="0"/>
+              <a:t>abruptly</a:t>
+            </a:r>
+            <a:r>
+              <a:rPr lang="fr-CH" dirty="0" smtClean="0"/>
+              <a:t> </a:t>
+            </a:r>
+            <a:r>
+              <a:rPr lang="fr-CH" dirty="0" err="1" smtClean="0"/>
+              <a:t>showing</a:t>
+            </a:r>
+            <a:r>
+              <a:rPr lang="fr-CH" dirty="0" smtClean="0"/>
+              <a:t> a </a:t>
+            </a:r>
+            <a:r>
+              <a:rPr lang="fr-CH" dirty="0" err="1" smtClean="0"/>
+              <a:t>problem</a:t>
+            </a:r>
+            <a:r>
+              <a:rPr lang="fr-CH" dirty="0" smtClean="0"/>
+              <a:t> of NA</a:t>
+            </a:r>
+          </a:p>
+          <a:p>
+            <a:r>
+              <a:rPr lang="fr-CH" dirty="0" err="1" smtClean="0"/>
+              <a:t>We</a:t>
+            </a:r>
+            <a:r>
+              <a:rPr lang="fr-CH" dirty="0" smtClean="0"/>
+              <a:t> </a:t>
+            </a:r>
+            <a:r>
+              <a:rPr lang="fr-CH" dirty="0" err="1" smtClean="0"/>
+              <a:t>get</a:t>
+            </a:r>
+            <a:r>
+              <a:rPr lang="fr-CH" dirty="0" smtClean="0"/>
+              <a:t> </a:t>
+            </a:r>
+            <a:r>
+              <a:rPr lang="fr-CH" dirty="0" err="1" smtClean="0"/>
+              <a:t>irregular</a:t>
+            </a:r>
+            <a:r>
+              <a:rPr lang="fr-CH" dirty="0" smtClean="0"/>
+              <a:t> </a:t>
+            </a:r>
+            <a:r>
+              <a:rPr lang="fr-CH" dirty="0" err="1" smtClean="0"/>
+              <a:t>shapes</a:t>
+            </a:r>
+            <a:r>
+              <a:rPr lang="fr-CH" dirty="0" smtClean="0"/>
+              <a:t> for </a:t>
+            </a:r>
+            <a:r>
+              <a:rPr lang="fr-CH" dirty="0" err="1" smtClean="0"/>
+              <a:t>most</a:t>
+            </a:r>
+            <a:r>
+              <a:rPr lang="fr-CH" dirty="0" smtClean="0"/>
+              <a:t> taxa, for </a:t>
+            </a:r>
+            <a:r>
+              <a:rPr lang="fr-CH" dirty="0" err="1" smtClean="0"/>
+              <a:t>some</a:t>
+            </a:r>
+            <a:r>
+              <a:rPr lang="fr-CH" dirty="0" smtClean="0"/>
+              <a:t> sites (</a:t>
+            </a:r>
+            <a:r>
+              <a:rPr lang="fr-CH" dirty="0" err="1" smtClean="0"/>
+              <a:t>see</a:t>
+            </a:r>
+            <a:r>
+              <a:rPr lang="fr-CH" dirty="0" smtClean="0"/>
+              <a:t> </a:t>
+            </a:r>
+            <a:r>
+              <a:rPr lang="fr-CH" dirty="0" err="1" smtClean="0"/>
+              <a:t>next</a:t>
+            </a:r>
+            <a:r>
+              <a:rPr lang="fr-CH" dirty="0" smtClean="0"/>
+              <a:t> slide)</a:t>
+            </a:r>
+          </a:p>
+          <a:p>
+            <a:pPr lvl="1"/>
+            <a:r>
+              <a:rPr lang="fr-CH" dirty="0" smtClean="0"/>
+              <a:t>It </a:t>
+            </a:r>
+            <a:r>
+              <a:rPr lang="fr-CH" dirty="0" err="1" smtClean="0"/>
+              <a:t>can’t</a:t>
+            </a:r>
+            <a:r>
+              <a:rPr lang="fr-CH" dirty="0" smtClean="0"/>
+              <a:t> </a:t>
+            </a:r>
+            <a:r>
+              <a:rPr lang="fr-CH" dirty="0" err="1" smtClean="0"/>
+              <a:t>be</a:t>
+            </a:r>
+            <a:r>
+              <a:rPr lang="fr-CH" dirty="0" smtClean="0"/>
+              <a:t> interactions </a:t>
+            </a:r>
+            <a:r>
+              <a:rPr lang="fr-CH" dirty="0" err="1" smtClean="0"/>
+              <a:t>with</a:t>
+            </a:r>
+            <a:r>
+              <a:rPr lang="fr-CH" dirty="0" smtClean="0"/>
+              <a:t> </a:t>
+            </a:r>
+            <a:r>
+              <a:rPr lang="fr-CH" dirty="0" err="1" smtClean="0"/>
+              <a:t>other</a:t>
+            </a:r>
+            <a:r>
+              <a:rPr lang="fr-CH" dirty="0" smtClean="0"/>
+              <a:t> </a:t>
+            </a:r>
+            <a:r>
+              <a:rPr lang="fr-CH" dirty="0" err="1" smtClean="0"/>
+              <a:t>environmental</a:t>
+            </a:r>
+            <a:r>
+              <a:rPr lang="fr-CH" dirty="0" smtClean="0"/>
+              <a:t> </a:t>
+            </a:r>
+            <a:r>
+              <a:rPr lang="fr-CH" dirty="0" err="1" smtClean="0"/>
+              <a:t>factors</a:t>
+            </a:r>
+            <a:r>
+              <a:rPr lang="fr-CH" dirty="0" smtClean="0"/>
+              <a:t> </a:t>
+            </a:r>
+            <a:r>
+              <a:rPr lang="fr-CH" dirty="0" err="1" smtClean="0"/>
+              <a:t>since</a:t>
+            </a:r>
+            <a:r>
+              <a:rPr lang="fr-CH" dirty="0" smtClean="0"/>
+              <a:t> </a:t>
+            </a:r>
+            <a:r>
+              <a:rPr lang="fr-CH" dirty="0" err="1" smtClean="0"/>
+              <a:t>they</a:t>
+            </a:r>
+            <a:r>
+              <a:rPr lang="fr-CH" dirty="0" smtClean="0"/>
+              <a:t> are all </a:t>
+            </a:r>
+            <a:r>
+              <a:rPr lang="fr-CH" dirty="0" err="1" smtClean="0"/>
+              <a:t>fixed</a:t>
+            </a:r>
+            <a:endParaRPr lang="fr-CH" dirty="0" smtClean="0"/>
+          </a:p>
+          <a:p>
+            <a:pPr lvl="1"/>
+            <a:r>
+              <a:rPr lang="fr-CH" dirty="0" err="1" smtClean="0"/>
+              <a:t>They</a:t>
+            </a:r>
+            <a:r>
+              <a:rPr lang="fr-CH" dirty="0" smtClean="0"/>
+              <a:t> are not a </a:t>
+            </a:r>
+            <a:r>
+              <a:rPr lang="fr-CH" dirty="0" err="1" smtClean="0"/>
+              <a:t>numerical</a:t>
+            </a:r>
+            <a:r>
+              <a:rPr lang="fr-CH" dirty="0" smtClean="0"/>
+              <a:t> </a:t>
+            </a:r>
+            <a:r>
+              <a:rPr lang="fr-CH" dirty="0" err="1" smtClean="0"/>
+              <a:t>problem</a:t>
+            </a:r>
+            <a:r>
+              <a:rPr lang="fr-CH" dirty="0" smtClean="0"/>
+              <a:t> </a:t>
+            </a:r>
+            <a:r>
+              <a:rPr lang="fr-CH" dirty="0" smtClean="0">
+                <a:sym typeface="Wingdings" panose="05000000000000000000" pitchFamily="2" charset="2"/>
+              </a:rPr>
+              <a:t> </a:t>
+            </a:r>
+            <a:r>
+              <a:rPr lang="fr-CH" dirty="0" err="1" smtClean="0">
+                <a:sym typeface="Wingdings" panose="05000000000000000000" pitchFamily="2" charset="2"/>
+              </a:rPr>
+              <a:t>biomass</a:t>
+            </a:r>
+            <a:r>
+              <a:rPr lang="fr-CH" dirty="0" smtClean="0">
+                <a:sym typeface="Wingdings" panose="05000000000000000000" pitchFamily="2" charset="2"/>
+              </a:rPr>
+              <a:t> time </a:t>
+            </a:r>
+            <a:r>
+              <a:rPr lang="fr-CH" dirty="0" err="1" smtClean="0">
+                <a:sym typeface="Wingdings" panose="05000000000000000000" pitchFamily="2" charset="2"/>
+              </a:rPr>
+              <a:t>series</a:t>
+            </a:r>
+            <a:r>
+              <a:rPr lang="fr-CH" dirty="0" smtClean="0">
+                <a:sym typeface="Wingdings" panose="05000000000000000000" pitchFamily="2" charset="2"/>
+              </a:rPr>
+              <a:t> look ok and </a:t>
+            </a:r>
+            <a:r>
+              <a:rPr lang="fr-CH" dirty="0" err="1" smtClean="0">
+                <a:sym typeface="Wingdings" panose="05000000000000000000" pitchFamily="2" charset="2"/>
+              </a:rPr>
+              <a:t>continuous</a:t>
+            </a:r>
+            <a:endParaRPr lang="fr-CH" dirty="0" smtClean="0">
+              <a:sym typeface="Wingdings" panose="05000000000000000000" pitchFamily="2" charset="2"/>
+            </a:endParaRPr>
+          </a:p>
+          <a:p>
+            <a:pPr lvl="1"/>
+            <a:endParaRPr lang="en-US" dirty="0"/>
+          </a:p>
+        </p:txBody>
+      </p:sp>
+    </p:spTree>
+    <p:extLst>
+      <p:ext uri="{BB962C8B-B14F-4D97-AF65-F5344CB8AC3E}">
+        <p14:creationId xmlns:p14="http://schemas.microsoft.com/office/powerpoint/2010/main" val="559433279"/>
+      </p:ext>
+    </p:extLst>
+  </p:cSld>
+  <p:clrMapOvr>
+    <a:masterClrMapping/>
+  </p:clrMapOvr>
+</p:sld>
+</file>
+
+<file path=ppt/slides/slide2.xml><?xml version="1.0" encoding="utf-8"?>
+<p:sld xmlns:a="http://schemas.openxmlformats.org/drawingml/2006/main" xmlns:r="http://schemas.openxmlformats.org/officeDocument/2006/relationships" xmlns:p="http://schemas.openxmlformats.org/presentationml/2006/main">
+  <p:cSld>
+    <p:spTree>
+      <p:nvGrpSpPr>
+        <p:cNvPr id="1" name=""/>
+        <p:cNvGrpSpPr/>
+        <p:nvPr/>
+      </p:nvGrpSpPr>
+      <p:grpSpPr>
+        <a:xfrm>
+          <a:off x="0" y="0"/>
+          <a:ext cx="0" cy="0"/>
+          <a:chOff x="0" y="0"/>
+          <a:chExt cx="0" cy="0"/>
+        </a:xfrm>
+      </p:grpSpPr>
+      <p:sp>
+        <p:nvSpPr>
+          <p:cNvPr id="4" name="Title 3"/>
+          <p:cNvSpPr>
+            <a:spLocks noGrp="1"/>
+          </p:cNvSpPr>
+          <p:nvPr>
+            <p:ph type="title"/>
+          </p:nvPr>
+        </p:nvSpPr>
+        <p:spPr/>
+        <p:txBody>
+          <a:bodyPr/>
+          <a:lstStyle/>
+          <a:p>
+            <a:r>
+              <a:rPr lang="fr-CH" dirty="0" smtClean="0"/>
+              <a:t>Sites and taxa </a:t>
+            </a:r>
+            <a:r>
+              <a:rPr lang="fr-CH" dirty="0" err="1" smtClean="0"/>
+              <a:t>with</a:t>
+            </a:r>
+            <a:r>
+              <a:rPr lang="fr-CH" dirty="0" smtClean="0"/>
+              <a:t> </a:t>
+            </a:r>
+            <a:r>
+              <a:rPr lang="fr-CH" dirty="0" err="1" smtClean="0"/>
+              <a:t>problems</a:t>
             </a:r>
             <a:endParaRPr lang="en-US" dirty="0"/>
           </a:p>
@@ -3079,15 +3563,6 @@
               </a:rPr>
               <a:t>SynthPoint2533Ti_Occurrence.Baetisalpinus</a:t>
             </a:r>
-            <a:endParaRPr kumimoji="0" lang="en-US" altLang="en-US" sz="2000" b="0" i="0" u="none" strike="noStrike" cap="none" normalizeH="0" baseline="0" dirty="0" smtClean="0">
-              <a:ln>
-                <a:noFill/>
-              </a:ln>
-              <a:solidFill>
-                <a:schemeClr val="accent2"/>
-              </a:solidFill>
-              <a:effectLst/>
-            </a:endParaRPr>
           </a:p>
           <a:p>
             <a:pPr marL="0" marR="0" lvl="0" indent="0" algn="l" defTabSz="914400" rtl="0" eaLnBrk="0" fontAlgn="base" latinLnBrk="0" hangingPunct="0">
@@ -3326,7 +3801,19 @@
                 </a:solidFill>
                 <a:effectLst/>
               </a:rPr>
-              <a:t> Problem for </a:t>
+              <a:t>Problem </a:t>
+            </a:r>
+            <a:r>
+              <a:rPr kumimoji="0" lang="en-US" altLang="en-US" sz="2000" b="0" i="0" u="none" strike="noStrike" cap="none" normalizeH="0" baseline="0" dirty="0" smtClean="0">
+                <a:ln>
+                  <a:noFill/>
+                </a:ln>
+                <a:solidFill>
+                  <a:srgbClr val="000000"/>
+                </a:solidFill>
+                <a:effectLst/>
+              </a:rPr>
+              <a:t>for </a:t>
             </a:r>
             <a:r>
               <a:rPr kumimoji="0" lang="en-US" altLang="en-US" sz="2000" b="0" i="0" u="none" strike="noStrike" cap="none" normalizeH="0" baseline="0" dirty="0" smtClean="0">
@@ -3614,6 +4101,733 @@
     <p:extLst>
       <p:ext uri="{BB962C8B-B14F-4D97-AF65-F5344CB8AC3E}">
         <p14:creationId xmlns:p14="http://schemas.microsoft.com/office/powerpoint/2010/main" val="1607719762"/>
+      </p:ext>
+    </p:extLst>
+  </p:cSld>
+  <p:clrMapOvr>
+    <a:masterClrMapping/>
+  </p:clrMapOvr>
+</p:sld>
+</file>
+
+<file path=ppt/slides/slide3.xml><?xml version="1.0" encoding="utf-8"?>
+<p:sld xmlns:a="http://schemas.openxmlformats.org/drawingml/2006/main" xmlns:r="http://schemas.openxmlformats.org/officeDocument/2006/relationships" xmlns:p="http://schemas.openxmlformats.org/presentationml/2006/main">
+  <p:cSld>
+    <p:spTree>
+      <p:nvGrpSpPr>
+        <p:cNvPr id="1" name=""/>
+        <p:cNvGrpSpPr/>
+        <p:nvPr/>
+      </p:nvGrpSpPr>
+      <p:grpSpPr>
+        <a:xfrm>
+          <a:off x="0" y="0"/>
+          <a:ext cx="0" cy="0"/>
+          <a:chOff x="0" y="0"/>
+          <a:chExt cx="0" cy="0"/>
+        </a:xfrm>
+      </p:grpSpPr>
+      <p:sp>
+        <p:nvSpPr>
+          <p:cNvPr id="2" name="Title 1"/>
+          <p:cNvSpPr>
+            <a:spLocks noGrp="1"/>
+          </p:cNvSpPr>
+          <p:nvPr>
+            <p:ph type="title"/>
+          </p:nvPr>
+        </p:nvSpPr>
+        <p:spPr/>
+        <p:txBody>
+          <a:bodyPr/>
+          <a:lstStyle/>
+          <a:p>
+            <a:r>
+              <a:rPr lang="fr-CH" dirty="0" err="1" smtClean="0"/>
+              <a:t>Hypothesis</a:t>
+            </a:r>
+            <a:endParaRPr lang="en-US" dirty="0"/>
+          </a:p>
+        </p:txBody>
+      </p:sp>
+      <p:sp>
+        <p:nvSpPr>
+          <p:cNvPr id="3" name="Content Placeholder 2"/>
+          <p:cNvSpPr>
+            <a:spLocks noGrp="1"/>
+          </p:cNvSpPr>
+          <p:nvPr>
+            <p:ph idx="1"/>
+          </p:nvPr>
+        </p:nvSpPr>
+        <p:spPr/>
+        <p:txBody>
+          <a:bodyPr>
+            <a:normAutofit fontScale="85000" lnSpcReduction="20000"/>
+          </a:bodyPr>
+          <a:lstStyle/>
+          <a:p>
+            <a:r>
+              <a:rPr lang="fr-CH" dirty="0" err="1" smtClean="0"/>
+              <a:t>Some</a:t>
+            </a:r>
+            <a:r>
+              <a:rPr lang="fr-CH" dirty="0" smtClean="0"/>
+              <a:t> taxa </a:t>
+            </a:r>
+            <a:r>
+              <a:rPr lang="fr-CH" dirty="0" err="1" smtClean="0"/>
+              <a:t>that</a:t>
+            </a:r>
+            <a:r>
+              <a:rPr lang="fr-CH" dirty="0" smtClean="0"/>
+              <a:t> are on top of the </a:t>
+            </a:r>
+            <a:r>
+              <a:rPr lang="fr-CH" dirty="0" err="1" smtClean="0"/>
+              <a:t>food</a:t>
+            </a:r>
+            <a:r>
+              <a:rPr lang="fr-CH" dirty="0" smtClean="0"/>
+              <a:t> </a:t>
+            </a:r>
+            <a:r>
+              <a:rPr lang="fr-CH" dirty="0" err="1" smtClean="0"/>
+              <a:t>chain</a:t>
+            </a:r>
+            <a:r>
+              <a:rPr lang="fr-CH" dirty="0" smtClean="0"/>
+              <a:t> have </a:t>
+            </a:r>
+            <a:r>
+              <a:rPr lang="fr-CH" b="1" dirty="0" err="1" smtClean="0"/>
+              <a:t>irregular</a:t>
+            </a:r>
+            <a:r>
+              <a:rPr lang="fr-CH" b="1" dirty="0" smtClean="0"/>
+              <a:t> </a:t>
+            </a:r>
+            <a:r>
+              <a:rPr lang="fr-CH" b="1" dirty="0" err="1" smtClean="0"/>
+              <a:t>temperature</a:t>
+            </a:r>
+            <a:r>
+              <a:rPr lang="fr-CH" b="1" dirty="0" smtClean="0"/>
+              <a:t> </a:t>
+            </a:r>
+            <a:r>
+              <a:rPr lang="fr-CH" b="1" dirty="0" err="1" smtClean="0"/>
+              <a:t>preference</a:t>
+            </a:r>
+            <a:r>
+              <a:rPr lang="fr-CH" dirty="0" smtClean="0"/>
+              <a:t>, </a:t>
+            </a:r>
+            <a:r>
+              <a:rPr lang="fr-CH" dirty="0" err="1" smtClean="0"/>
+              <a:t>which</a:t>
+            </a:r>
+            <a:r>
+              <a:rPr lang="fr-CH" dirty="0" smtClean="0"/>
+              <a:t> </a:t>
+            </a:r>
+            <a:r>
+              <a:rPr lang="fr-CH" dirty="0" err="1" smtClean="0"/>
+              <a:t>seems</a:t>
+            </a:r>
+            <a:r>
+              <a:rPr lang="fr-CH" dirty="0" smtClean="0"/>
+              <a:t> to </a:t>
+            </a:r>
+            <a:r>
+              <a:rPr lang="fr-CH" dirty="0" err="1" smtClean="0"/>
+              <a:t>enforce</a:t>
+            </a:r>
+            <a:r>
+              <a:rPr lang="fr-CH" dirty="0" smtClean="0"/>
+              <a:t> </a:t>
+            </a:r>
+            <a:r>
+              <a:rPr lang="fr-CH" dirty="0" err="1" smtClean="0"/>
+              <a:t>weird</a:t>
+            </a:r>
+            <a:r>
+              <a:rPr lang="fr-CH" dirty="0" smtClean="0"/>
+              <a:t> </a:t>
+            </a:r>
+            <a:r>
+              <a:rPr lang="fr-CH" dirty="0" err="1" smtClean="0"/>
+              <a:t>response</a:t>
+            </a:r>
+            <a:r>
+              <a:rPr lang="fr-CH" dirty="0" smtClean="0"/>
+              <a:t> </a:t>
+            </a:r>
+            <a:r>
+              <a:rPr lang="fr-CH" dirty="0" err="1" smtClean="0"/>
+              <a:t>shape</a:t>
+            </a:r>
+            <a:r>
+              <a:rPr lang="fr-CH" dirty="0" smtClean="0"/>
+              <a:t> to </a:t>
+            </a:r>
+            <a:r>
+              <a:rPr lang="fr-CH" dirty="0" err="1" smtClean="0"/>
+              <a:t>other</a:t>
+            </a:r>
+            <a:r>
+              <a:rPr lang="fr-CH" dirty="0" smtClean="0"/>
+              <a:t> taxa</a:t>
+            </a:r>
+            <a:endParaRPr lang="en-US" dirty="0" smtClean="0"/>
+          </a:p>
+          <a:p>
+            <a:pPr lvl="1"/>
+            <a:r>
+              <a:rPr lang="en-US" dirty="0" err="1" smtClean="0">
+                <a:solidFill>
+                  <a:schemeClr val="accent6"/>
+                </a:solidFill>
+              </a:rPr>
+              <a:t>Drususbiguttatus</a:t>
+            </a:r>
+            <a:endParaRPr lang="en-US" dirty="0" smtClean="0">
+              <a:solidFill>
+                <a:schemeClr val="accent6"/>
+              </a:solidFill>
+            </a:endParaRPr>
+          </a:p>
+          <a:p>
+            <a:pPr lvl="1"/>
+            <a:r>
+              <a:rPr lang="en-US" dirty="0" err="1" smtClean="0">
+                <a:solidFill>
+                  <a:schemeClr val="accent6"/>
+                </a:solidFill>
+              </a:rPr>
+              <a:t>Chironomidae</a:t>
+            </a:r>
+            <a:endParaRPr lang="en-US" dirty="0" smtClean="0">
+              <a:solidFill>
+                <a:schemeClr val="accent6"/>
+              </a:solidFill>
+            </a:endParaRPr>
+          </a:p>
+          <a:p>
+            <a:pPr lvl="1"/>
+            <a:r>
+              <a:rPr lang="en-US" dirty="0" err="1" smtClean="0">
+                <a:solidFill>
+                  <a:schemeClr val="accent6"/>
+                </a:solidFill>
+              </a:rPr>
+              <a:t>Drususdiscolor</a:t>
+            </a:r>
+            <a:endParaRPr lang="en-US" dirty="0" smtClean="0">
+              <a:solidFill>
+                <a:schemeClr val="accent6"/>
+              </a:solidFill>
+            </a:endParaRPr>
+          </a:p>
+          <a:p>
+            <a:pPr lvl="1"/>
+            <a:r>
+              <a:rPr lang="en-US" dirty="0" err="1" smtClean="0">
+                <a:solidFill>
+                  <a:schemeClr val="accent6"/>
+                </a:solidFill>
+              </a:rPr>
+              <a:t>Cryptothrixnebulicola</a:t>
+            </a:r>
+            <a:endParaRPr lang="en-US" dirty="0" smtClean="0">
+              <a:solidFill>
+                <a:schemeClr val="accent6"/>
+              </a:solidFill>
+            </a:endParaRPr>
+          </a:p>
+          <a:p>
+            <a:pPr lvl="1"/>
+            <a:r>
+              <a:rPr lang="en-US" dirty="0" err="1" smtClean="0">
+                <a:solidFill>
+                  <a:schemeClr val="accent6"/>
+                </a:solidFill>
+              </a:rPr>
+              <a:t>Baetislutheri</a:t>
+            </a:r>
+            <a:endParaRPr lang="en-US" dirty="0" smtClean="0">
+              <a:solidFill>
+                <a:schemeClr val="accent6"/>
+              </a:solidFill>
+            </a:endParaRPr>
+          </a:p>
+          <a:p>
+            <a:pPr lvl="1"/>
+            <a:r>
+              <a:rPr lang="en-US" dirty="0" err="1" smtClean="0">
+                <a:solidFill>
+                  <a:schemeClr val="accent6"/>
+                </a:solidFill>
+              </a:rPr>
+              <a:t>Drususmelanchaetes</a:t>
+            </a:r>
+            <a:endParaRPr lang="en-US" dirty="0" smtClean="0">
+              <a:solidFill>
+                <a:schemeClr val="accent6"/>
+              </a:solidFill>
+            </a:endParaRPr>
+          </a:p>
+          <a:p>
+            <a:pPr lvl="1"/>
+            <a:r>
+              <a:rPr lang="en-US" dirty="0" err="1" smtClean="0"/>
+              <a:t>Drususmuelleri</a:t>
+            </a:r>
+            <a:endParaRPr lang="en-US" dirty="0" smtClean="0"/>
+          </a:p>
+          <a:p>
+            <a:pPr lvl="1"/>
+            <a:r>
+              <a:rPr lang="en-US" dirty="0" err="1" smtClean="0"/>
+              <a:t>Drususnigrescens</a:t>
+            </a:r>
+            <a:endParaRPr lang="en-US" dirty="0" smtClean="0"/>
+          </a:p>
+          <a:p>
+            <a:pPr lvl="1"/>
+            <a:r>
+              <a:rPr lang="en-US" dirty="0" err="1"/>
+              <a:t>Drususmonticola</a:t>
+            </a:r>
+            <a:endParaRPr lang="fr-CH" dirty="0" smtClean="0">
+              <a:solidFill>
+                <a:srgbClr val="FF0000"/>
+              </a:solidFill>
+            </a:endParaRPr>
+          </a:p>
+          <a:p>
+            <a:pPr lvl="1"/>
+            <a:r>
+              <a:rPr lang="en-US" dirty="0" err="1" smtClean="0"/>
+              <a:t>Drususalpinus</a:t>
+            </a:r>
+            <a:endParaRPr lang="en-US" dirty="0" smtClean="0"/>
+          </a:p>
+          <a:p>
+            <a:pPr lvl="1"/>
+            <a:r>
+              <a:rPr lang="en-US" dirty="0" err="1" smtClean="0"/>
+              <a:t>Protonemuraauberti</a:t>
+            </a:r>
+            <a:endParaRPr lang="en-US" dirty="0" smtClean="0"/>
+          </a:p>
+          <a:p>
+            <a:pPr lvl="1"/>
+            <a:r>
+              <a:rPr lang="en-US" dirty="0" err="1"/>
+              <a:t>Isoperlacarbonaria</a:t>
+            </a:r>
+            <a:endParaRPr lang="en-US" dirty="0"/>
+          </a:p>
+        </p:txBody>
+      </p:sp>
+    </p:spTree>
+    <p:extLst>
+      <p:ext uri="{BB962C8B-B14F-4D97-AF65-F5344CB8AC3E}">
+        <p14:creationId xmlns:p14="http://schemas.microsoft.com/office/powerpoint/2010/main" val="632695985"/>
+      </p:ext>
+    </p:extLst>
+  </p:cSld>
+  <p:clrMapOvr>
+    <a:masterClrMapping/>
+  </p:clrMapOvr>
+</p:sld>
+</file>
+
+<file path=ppt/slides/slide4.xml><?xml version="1.0" encoding="utf-8"?>
+<p:sld xmlns:a="http://schemas.openxmlformats.org/drawingml/2006/main" xmlns:r="http://schemas.openxmlformats.org/officeDocument/2006/relationships" xmlns:p="http://schemas.openxmlformats.org/presentationml/2006/main">
+  <p:cSld>
+    <p:spTree>
+      <p:nvGrpSpPr>
+        <p:cNvPr id="1" name=""/>
+        <p:cNvGrpSpPr/>
+        <p:nvPr/>
+      </p:nvGrpSpPr>
+      <p:grpSpPr>
+        <a:xfrm>
+          <a:off x="0" y="0"/>
+          <a:ext cx="0" cy="0"/>
+          <a:chOff x="0" y="0"/>
+          <a:chExt cx="0" cy="0"/>
+        </a:xfrm>
+      </p:grpSpPr>
+      <p:sp>
+        <p:nvSpPr>
+          <p:cNvPr id="2" name="Title 1"/>
+          <p:cNvSpPr>
+            <a:spLocks noGrp="1"/>
+          </p:cNvSpPr>
+          <p:nvPr>
+            <p:ph type="title"/>
+          </p:nvPr>
+        </p:nvSpPr>
+        <p:spPr/>
+        <p:txBody>
+          <a:bodyPr/>
+          <a:lstStyle/>
+          <a:p>
+            <a:r>
+              <a:rPr lang="fr-CH" dirty="0" err="1" smtClean="0"/>
+              <a:t>Hypothesis</a:t>
+            </a:r>
+            <a:endParaRPr lang="en-US" dirty="0"/>
+          </a:p>
+        </p:txBody>
+      </p:sp>
+      <p:sp>
+        <p:nvSpPr>
+          <p:cNvPr id="3" name="Content Placeholder 2"/>
+          <p:cNvSpPr>
+            <a:spLocks noGrp="1"/>
+          </p:cNvSpPr>
+          <p:nvPr>
+            <p:ph idx="1"/>
+          </p:nvPr>
+        </p:nvSpPr>
+        <p:spPr/>
+        <p:txBody>
+          <a:bodyPr/>
+          <a:lstStyle/>
+          <a:p>
+            <a:r>
+              <a:rPr lang="fr-CH" dirty="0" err="1" smtClean="0"/>
+              <a:t>Some</a:t>
+            </a:r>
+            <a:r>
+              <a:rPr lang="fr-CH" dirty="0" smtClean="0"/>
+              <a:t> taxa </a:t>
+            </a:r>
+            <a:r>
+              <a:rPr lang="fr-CH" dirty="0" err="1" smtClean="0"/>
+              <a:t>higher</a:t>
+            </a:r>
+            <a:r>
+              <a:rPr lang="fr-CH" dirty="0" smtClean="0"/>
+              <a:t> in the </a:t>
+            </a:r>
+            <a:r>
+              <a:rPr lang="fr-CH" dirty="0" err="1" smtClean="0"/>
+              <a:t>food</a:t>
+            </a:r>
+            <a:r>
+              <a:rPr lang="fr-CH" dirty="0" smtClean="0"/>
+              <a:t> web have a </a:t>
+            </a:r>
+            <a:r>
+              <a:rPr lang="fr-CH" b="1" dirty="0" err="1" smtClean="0"/>
+              <a:t>peak</a:t>
+            </a:r>
+            <a:r>
+              <a:rPr lang="fr-CH" b="1" dirty="0" smtClean="0"/>
+              <a:t> of </a:t>
+            </a:r>
+            <a:r>
+              <a:rPr lang="fr-CH" b="1" dirty="0" err="1" smtClean="0"/>
+              <a:t>abundance</a:t>
+            </a:r>
+            <a:r>
+              <a:rPr lang="fr-CH" b="1" dirty="0" smtClean="0"/>
+              <a:t> </a:t>
+            </a:r>
+            <a:r>
+              <a:rPr lang="fr-CH" dirty="0" smtClean="0"/>
+              <a:t>and </a:t>
+            </a:r>
+            <a:r>
+              <a:rPr lang="fr-CH" dirty="0" err="1" smtClean="0"/>
+              <a:t>it</a:t>
+            </a:r>
+            <a:r>
+              <a:rPr lang="fr-CH" dirty="0" smtClean="0"/>
+              <a:t> </a:t>
+            </a:r>
+            <a:r>
+              <a:rPr lang="fr-CH" dirty="0" err="1" smtClean="0"/>
+              <a:t>makes</a:t>
+            </a:r>
+            <a:r>
+              <a:rPr lang="fr-CH" dirty="0" smtClean="0"/>
+              <a:t> an </a:t>
+            </a:r>
+            <a:r>
+              <a:rPr lang="fr-CH" dirty="0" err="1" smtClean="0"/>
+              <a:t>irregular</a:t>
+            </a:r>
+            <a:r>
+              <a:rPr lang="fr-CH" dirty="0" smtClean="0"/>
+              <a:t> </a:t>
+            </a:r>
+            <a:r>
+              <a:rPr lang="fr-CH" dirty="0" err="1" smtClean="0"/>
+              <a:t>shape</a:t>
+            </a:r>
+            <a:r>
+              <a:rPr lang="fr-CH" dirty="0" smtClean="0"/>
+              <a:t> in </a:t>
+            </a:r>
+            <a:r>
+              <a:rPr lang="fr-CH" dirty="0" err="1" smtClean="0"/>
+              <a:t>other</a:t>
+            </a:r>
+            <a:r>
+              <a:rPr lang="fr-CH" dirty="0" smtClean="0"/>
+              <a:t> taxa</a:t>
+            </a:r>
+          </a:p>
+          <a:p>
+            <a:pPr lvl="1"/>
+            <a:r>
+              <a:rPr lang="en-US" dirty="0" err="1" smtClean="0"/>
+              <a:t>Chloroperlasusemicheli</a:t>
+            </a:r>
+            <a:r>
+              <a:rPr lang="en-US" dirty="0" smtClean="0"/>
+              <a:t> </a:t>
+            </a:r>
+            <a:r>
+              <a:rPr lang="en-US" dirty="0" smtClean="0">
+                <a:sym typeface="Wingdings" panose="05000000000000000000" pitchFamily="2" charset="2"/>
+              </a:rPr>
+              <a:t> tried to put </a:t>
+            </a:r>
+            <a:r>
+              <a:rPr lang="en-US" dirty="0" err="1" smtClean="0">
+                <a:sym typeface="Wingdings" panose="05000000000000000000" pitchFamily="2" charset="2"/>
+              </a:rPr>
+              <a:t>pref</a:t>
+            </a:r>
+            <a:r>
+              <a:rPr lang="en-US" dirty="0" smtClean="0">
+                <a:sym typeface="Wingdings" panose="05000000000000000000" pitchFamily="2" charset="2"/>
+              </a:rPr>
+              <a:t> to temp 0</a:t>
+            </a:r>
+            <a:endParaRPr lang="en-US" dirty="0"/>
+          </a:p>
+        </p:txBody>
+      </p:sp>
+    </p:spTree>
+    <p:extLst>
+      <p:ext uri="{BB962C8B-B14F-4D97-AF65-F5344CB8AC3E}">
+        <p14:creationId xmlns:p14="http://schemas.microsoft.com/office/powerpoint/2010/main" val="2380066334"/>
+      </p:ext>
+    </p:extLst>
+  </p:cSld>
+  <p:clrMapOvr>
+    <a:masterClrMapping/>
+  </p:clrMapOvr>
+</p:sld>
+</file>
+
+<file path=ppt/slides/slide5.xml><?xml version="1.0" encoding="utf-8"?>
+<p:sld xmlns:a="http://schemas.openxmlformats.org/drawingml/2006/main" xmlns:r="http://schemas.openxmlformats.org/officeDocument/2006/relationships" xmlns:p="http://schemas.openxmlformats.org/presentationml/2006/main">
+  <p:cSld>
+    <p:spTree>
+      <p:nvGrpSpPr>
+        <p:cNvPr id="1" name=""/>
+        <p:cNvGrpSpPr/>
+        <p:nvPr/>
+      </p:nvGrpSpPr>
+      <p:grpSpPr>
+        <a:xfrm>
+          <a:off x="0" y="0"/>
+          <a:ext cx="0" cy="0"/>
+          <a:chOff x="0" y="0"/>
+          <a:chExt cx="0" cy="0"/>
+        </a:xfrm>
+      </p:grpSpPr>
+      <p:sp>
+        <p:nvSpPr>
+          <p:cNvPr id="2" name="Title 1"/>
+          <p:cNvSpPr>
+            <a:spLocks noGrp="1"/>
+          </p:cNvSpPr>
+          <p:nvPr>
+            <p:ph type="title"/>
+          </p:nvPr>
+        </p:nvSpPr>
+        <p:spPr/>
+        <p:txBody>
+          <a:bodyPr/>
+          <a:lstStyle/>
+          <a:p>
+            <a:r>
+              <a:rPr lang="fr-CH" dirty="0" err="1" smtClean="0"/>
+              <a:t>Problem</a:t>
+            </a:r>
+            <a:endParaRPr lang="en-US" dirty="0"/>
+          </a:p>
+        </p:txBody>
+      </p:sp>
+      <p:sp>
+        <p:nvSpPr>
+          <p:cNvPr id="3" name="Content Placeholder 2"/>
+          <p:cNvSpPr>
+            <a:spLocks noGrp="1"/>
+          </p:cNvSpPr>
+          <p:nvPr>
+            <p:ph idx="1"/>
+          </p:nvPr>
+        </p:nvSpPr>
+        <p:spPr/>
+        <p:txBody>
+          <a:bodyPr/>
+          <a:lstStyle/>
+          <a:p>
+            <a:r>
+              <a:rPr lang="fr-CH" dirty="0" err="1" smtClean="0"/>
+              <a:t>Some</a:t>
+            </a:r>
+            <a:r>
+              <a:rPr lang="fr-CH" dirty="0" smtClean="0"/>
+              <a:t> taxa and sites </a:t>
+            </a:r>
+            <a:r>
+              <a:rPr lang="fr-CH" dirty="0" err="1" smtClean="0"/>
+              <a:t>didn’t</a:t>
+            </a:r>
+            <a:r>
+              <a:rPr lang="fr-CH" dirty="0" smtClean="0"/>
+              <a:t> </a:t>
+            </a:r>
+            <a:r>
+              <a:rPr lang="fr-CH" dirty="0" err="1" smtClean="0"/>
+              <a:t>reach</a:t>
+            </a:r>
+            <a:r>
+              <a:rPr lang="fr-CH" dirty="0" smtClean="0"/>
+              <a:t> </a:t>
+            </a:r>
+            <a:r>
+              <a:rPr lang="fr-CH" dirty="0" err="1" smtClean="0"/>
+              <a:t>equilibrium</a:t>
+            </a:r>
+            <a:endParaRPr lang="fr-CH" dirty="0" smtClean="0"/>
+          </a:p>
+          <a:p>
+            <a:pPr lvl="1"/>
+            <a:r>
+              <a:rPr lang="fr-CH" dirty="0" err="1" smtClean="0"/>
+              <a:t>Adapt</a:t>
+            </a:r>
+            <a:r>
+              <a:rPr lang="fr-CH" dirty="0" smtClean="0"/>
+              <a:t> warning, and </a:t>
+            </a:r>
+            <a:r>
+              <a:rPr lang="fr-CH" dirty="0" err="1" smtClean="0"/>
+              <a:t>run</a:t>
+            </a:r>
+            <a:r>
+              <a:rPr lang="fr-CH" dirty="0" smtClean="0"/>
+              <a:t> for longer </a:t>
+            </a:r>
+            <a:r>
+              <a:rPr lang="fr-CH" dirty="0" err="1" smtClean="0"/>
+              <a:t>years</a:t>
+            </a:r>
+            <a:endParaRPr lang="fr-CH" dirty="0" smtClean="0"/>
+          </a:p>
+          <a:p>
+            <a:pPr lvl="1"/>
+            <a:r>
+              <a:rPr lang="fr-CH" dirty="0" err="1" smtClean="0"/>
+              <a:t>We</a:t>
+            </a:r>
+            <a:r>
+              <a:rPr lang="fr-CH" dirty="0" smtClean="0"/>
+              <a:t> </a:t>
+            </a:r>
+            <a:r>
+              <a:rPr lang="fr-CH" dirty="0" err="1" smtClean="0"/>
+              <a:t>see</a:t>
+            </a:r>
+            <a:r>
+              <a:rPr lang="fr-CH" dirty="0" smtClean="0"/>
+              <a:t> </a:t>
+            </a:r>
+            <a:r>
+              <a:rPr lang="fr-CH" dirty="0" err="1" smtClean="0"/>
+              <a:t>that</a:t>
+            </a:r>
+            <a:r>
+              <a:rPr lang="fr-CH" dirty="0" smtClean="0"/>
+              <a:t> for </a:t>
+            </a:r>
+            <a:r>
+              <a:rPr lang="fr-CH" dirty="0" err="1" smtClean="0"/>
+              <a:t>some</a:t>
+            </a:r>
+            <a:r>
+              <a:rPr lang="fr-CH" dirty="0" smtClean="0"/>
+              <a:t> taxa </a:t>
+            </a:r>
+            <a:r>
+              <a:rPr lang="fr-CH" dirty="0" err="1" smtClean="0"/>
+              <a:t>it</a:t>
+            </a:r>
+            <a:r>
+              <a:rPr lang="fr-CH" dirty="0" smtClean="0"/>
+              <a:t> </a:t>
+            </a:r>
+            <a:r>
+              <a:rPr lang="fr-CH" dirty="0" err="1" smtClean="0"/>
+              <a:t>might</a:t>
+            </a:r>
+            <a:r>
+              <a:rPr lang="fr-CH" dirty="0" smtClean="0"/>
+              <a:t> </a:t>
+            </a:r>
+            <a:r>
+              <a:rPr lang="fr-CH" dirty="0" err="1" smtClean="0"/>
+              <a:t>even</a:t>
+            </a:r>
+            <a:r>
+              <a:rPr lang="fr-CH" dirty="0" smtClean="0"/>
+              <a:t> </a:t>
+            </a:r>
+            <a:r>
+              <a:rPr lang="fr-CH" dirty="0" err="1" smtClean="0"/>
+              <a:t>take</a:t>
+            </a:r>
+            <a:r>
+              <a:rPr lang="fr-CH" dirty="0" smtClean="0"/>
+              <a:t> </a:t>
+            </a:r>
+            <a:r>
+              <a:rPr lang="fr-CH" dirty="0" err="1" smtClean="0"/>
+              <a:t>between</a:t>
+            </a:r>
+            <a:r>
+              <a:rPr lang="fr-CH" dirty="0" smtClean="0"/>
+              <a:t> 25 and 50 </a:t>
+            </a:r>
+            <a:r>
+              <a:rPr lang="fr-CH" dirty="0" err="1" smtClean="0"/>
+              <a:t>years</a:t>
+            </a:r>
+            <a:endParaRPr lang="fr-CH" dirty="0" smtClean="0"/>
+          </a:p>
+          <a:p>
+            <a:pPr lvl="1"/>
+            <a:endParaRPr lang="en-US" dirty="0"/>
+          </a:p>
+        </p:txBody>
+      </p:sp>
+    </p:spTree>
+    <p:extLst>
+      <p:ext uri="{BB962C8B-B14F-4D97-AF65-F5344CB8AC3E}">
+        <p14:creationId xmlns:p14="http://schemas.microsoft.com/office/powerpoint/2010/main" val="2776553587"/>
       </p:ext>
     </p:extLst>
   </p:cSld>

</xml_diff>